<commit_message>
Enemy Browse Function Reinforcement
</commit_message>
<xml_diff>
--- a/Documents/기획/시스템기획/게임플레이기획_시스템.pptx
+++ b/Documents/기획/시스템기획/게임플레이기획_시스템.pptx
@@ -3135,11 +3135,7 @@
             </a:r>
             <a:r>
               <a:rPr lang="ko-KR" altLang="en-US" dirty="0" smtClean="0"/>
-              <a:t>들고 던질 수 있는 </a:t>
-            </a:r>
-            <a:r>
-              <a:rPr lang="ko-KR" altLang="en-US" dirty="0" smtClean="0"/>
-              <a:t>드럼통</a:t>
+              <a:t>들고 던질 수 있는 드럼통</a:t>
             </a:r>
             <a:r>
               <a:rPr lang="en-US" altLang="ko-KR" dirty="0" smtClean="0"/>
@@ -3159,11 +3155,7 @@
             </a:r>
             <a:r>
               <a:rPr lang="ko-KR" altLang="en-US" dirty="0" smtClean="0"/>
-              <a:t> 나눠야 </a:t>
-            </a:r>
-            <a:r>
-              <a:rPr lang="ko-KR" altLang="en-US" dirty="0" smtClean="0"/>
-              <a:t>한다</a:t>
+              <a:t> 나눠야 한다</a:t>
             </a:r>
             <a:r>
               <a:rPr lang="en-US" altLang="ko-KR" dirty="0" smtClean="0"/>
@@ -3201,7 +3193,6 @@
               <a:rPr lang="en-US" altLang="ko-KR" dirty="0" smtClean="0"/>
               <a:t>)</a:t>
             </a:r>
-            <a:endParaRPr lang="en-US" altLang="ko-KR" dirty="0" smtClean="0"/>
           </a:p>
           <a:p>
             <a:r>
@@ -3288,11 +3279,7 @@
             </a:r>
             <a:r>
               <a:rPr lang="ko-KR" altLang="en-US" dirty="0" smtClean="0"/>
-              <a:t>플레이어와 </a:t>
-            </a:r>
-            <a:r>
-              <a:rPr lang="ko-KR" altLang="en-US" dirty="0" smtClean="0"/>
-              <a:t>다른 </a:t>
+              <a:t>플레이어와 다른 </a:t>
             </a:r>
             <a:r>
               <a:rPr lang="ko-KR" altLang="en-US" dirty="0" err="1" smtClean="0"/>
@@ -3300,11 +3287,7 @@
             </a:r>
             <a:r>
               <a:rPr lang="ko-KR" altLang="en-US" dirty="0" smtClean="0"/>
-              <a:t> 충돌하고 </a:t>
-            </a:r>
-            <a:r>
-              <a:rPr lang="ko-KR" altLang="en-US" dirty="0" smtClean="0"/>
-              <a:t>있는 상태에서는 그 시간대로 이동할 수 없게 한다</a:t>
+              <a:t> 충돌하고 있는 상태에서는 그 시간대로 이동할 수 없게 한다</a:t>
             </a:r>
             <a:r>
               <a:rPr lang="en-US" altLang="ko-KR" dirty="0" smtClean="0"/>
@@ -3406,11 +3389,7 @@
             </a:r>
             <a:r>
               <a:rPr lang="ko-KR" altLang="en-US" dirty="0" smtClean="0"/>
-              <a:t> </a:t>
-            </a:r>
-            <a:r>
-              <a:rPr lang="ko-KR" altLang="en-US" dirty="0" smtClean="0"/>
-              <a:t>행동</a:t>
+              <a:t> 행동</a:t>
             </a:r>
             <a:r>
               <a:rPr lang="en-US" altLang="ko-KR" dirty="0" smtClean="0"/>
@@ -3513,7 +3492,6 @@
               <a:rPr lang="en-US" altLang="ko-KR" sz="2400" dirty="0" smtClean="0"/>
               <a:t>)</a:t>
             </a:r>
-            <a:endParaRPr lang="en-US" altLang="ko-KR" sz="2400" dirty="0" smtClean="0"/>
           </a:p>
           <a:p>
             <a:r>
@@ -3534,15 +3512,19 @@
             </a:r>
             <a:r>
               <a:rPr lang="en-US" altLang="ko-KR" sz="2400" dirty="0" smtClean="0"/>
-              <a:t>, c</a:t>
+              <a:t>, </a:t>
             </a:r>
             <a:r>
               <a:rPr lang="en-US" altLang="ko-KR" sz="2400" dirty="0" smtClean="0"/>
-              <a:t>trl</a:t>
+              <a:t>S</a:t>
             </a:r>
             <a:r>
               <a:rPr lang="ko-KR" altLang="en-US" sz="2400" dirty="0" smtClean="0"/>
-              <a:t>키를 누르고 있어야 한다</a:t>
+              <a:t>키를 </a:t>
+            </a:r>
+            <a:r>
+              <a:rPr lang="ko-KR" altLang="en-US" sz="2400" dirty="0" smtClean="0"/>
+              <a:t>누르고 있어야 한다</a:t>
             </a:r>
             <a:r>
               <a:rPr lang="en-US" altLang="ko-KR" sz="2400" dirty="0" smtClean="0"/>
@@ -3560,7 +3542,6 @@
               <a:rPr lang="en-US" altLang="ko-KR" sz="2400" dirty="0" smtClean="0"/>
               <a:t>)</a:t>
             </a:r>
-            <a:endParaRPr lang="en-US" altLang="ko-KR" sz="2400" dirty="0" smtClean="0"/>
           </a:p>
           <a:p>
             <a:r>
@@ -3636,45 +3617,6 @@
                 <a:srgbClr val="FF0000"/>
               </a:solidFill>
             </a:endParaRPr>
-          </a:p>
-          <a:p>
-            <a:r>
-              <a:rPr lang="ko-KR" altLang="en-US" sz="2400" dirty="0" smtClean="0">
-                <a:solidFill>
-                  <a:srgbClr val="FF0000"/>
-                </a:solidFill>
-              </a:rPr>
-              <a:t>숨기</a:t>
-            </a:r>
-            <a:r>
-              <a:rPr lang="en-US" altLang="ko-KR" sz="2400" dirty="0" smtClean="0"/>
-              <a:t>(</a:t>
-            </a:r>
-            <a:r>
-              <a:rPr lang="ko-KR" altLang="en-US" sz="2400" dirty="0" smtClean="0"/>
-              <a:t>특정 상호작용 오브젝트에 숨어있는 상태</a:t>
-            </a:r>
-            <a:r>
-              <a:rPr lang="en-US" altLang="ko-KR" sz="2400" dirty="0" smtClean="0"/>
-              <a:t>, </a:t>
-            </a:r>
-            <a:r>
-              <a:rPr lang="ko-KR" altLang="en-US" sz="2400" dirty="0" smtClean="0"/>
-              <a:t>숨을 수 있는 오브젝트 근처에서 상호작용 키를 누르면 숨기 상태로 변환된다</a:t>
-            </a:r>
-            <a:r>
-              <a:rPr lang="en-US" altLang="ko-KR" sz="2400" dirty="0" smtClean="0"/>
-              <a:t>. </a:t>
-            </a:r>
-            <a:r>
-              <a:rPr lang="ko-KR" altLang="en-US" sz="2400" dirty="0" smtClean="0"/>
-              <a:t>다시 키를 눌러야만 일반 상태로 돌아올 수 있다</a:t>
-            </a:r>
-            <a:r>
-              <a:rPr lang="en-US" altLang="ko-KR" sz="2400" dirty="0" smtClean="0"/>
-              <a:t>.)</a:t>
-            </a:r>
-            <a:endParaRPr lang="en-US" altLang="ko-KR" sz="2400" dirty="0"/>
           </a:p>
         </p:txBody>
       </p:sp>
@@ -3744,11 +3686,7 @@
             </a:r>
             <a:r>
               <a:rPr lang="ko-KR" altLang="en-US" dirty="0" smtClean="0"/>
-              <a:t> </a:t>
-            </a:r>
-            <a:r>
-              <a:rPr lang="ko-KR" altLang="en-US" dirty="0" smtClean="0"/>
-              <a:t>행동</a:t>
+              <a:t> 행동</a:t>
             </a:r>
             <a:r>
               <a:rPr lang="en-US" altLang="ko-KR" dirty="0"/>
@@ -3809,13 +3747,8 @@
             </a:r>
             <a:r>
               <a:rPr lang="en-US" altLang="ko-KR" sz="2400" dirty="0" smtClean="0"/>
-              <a:t>.</a:t>
-            </a:r>
-            <a:r>
-              <a:rPr lang="en-US" altLang="ko-KR" sz="2400" dirty="0" smtClean="0"/>
-              <a:t>)</a:t>
-            </a:r>
-            <a:endParaRPr lang="en-US" altLang="ko-KR" sz="2400" dirty="0" smtClean="0"/>
+              <a:t>.)</a:t>
+            </a:r>
           </a:p>
           <a:p>
             <a:r>
@@ -3832,11 +3765,7 @@
             </a:r>
             <a:r>
               <a:rPr lang="ko-KR" altLang="en-US" sz="2400" dirty="0" smtClean="0"/>
-              <a:t>벽 모서리에 </a:t>
-            </a:r>
-            <a:r>
-              <a:rPr lang="ko-KR" altLang="en-US" sz="2400" dirty="0" smtClean="0"/>
-              <a:t>매달리고 있는 상태</a:t>
+              <a:t>벽 모서리에 매달리고 있는 상태</a:t>
             </a:r>
             <a:r>
               <a:rPr lang="en-US" altLang="ko-KR" sz="2400" dirty="0" smtClean="0"/>
@@ -3872,13 +3801,8 @@
             </a:r>
             <a:r>
               <a:rPr lang="en-US" altLang="ko-KR" sz="2400" dirty="0" smtClean="0"/>
-              <a:t>.</a:t>
-            </a:r>
-            <a:r>
-              <a:rPr lang="en-US" altLang="ko-KR" sz="2400" dirty="0" smtClean="0"/>
-              <a:t>)</a:t>
-            </a:r>
-            <a:endParaRPr lang="en-US" altLang="ko-KR" sz="2400" dirty="0" smtClean="0"/>
+              <a:t>.)</a:t>
+            </a:r>
           </a:p>
           <a:p>
             <a:r>
@@ -3938,15 +3862,7 @@
                   <a:srgbClr val="FF0000"/>
                 </a:solidFill>
               </a:rPr>
-              <a:t>사다리 오르</a:t>
-            </a:r>
-            <a:r>
-              <a:rPr lang="ko-KR" altLang="en-US" sz="2400" dirty="0" smtClean="0">
-                <a:solidFill>
-                  <a:srgbClr val="FF0000"/>
-                </a:solidFill>
-              </a:rPr>
-              <a:t>내리기</a:t>
+              <a:t>사다리 오르내리기</a:t>
             </a:r>
             <a:r>
               <a:rPr lang="en-US" altLang="ko-KR" sz="2400" dirty="0" smtClean="0"/>
@@ -3976,7 +3892,6 @@
               <a:rPr lang="en-US" altLang="ko-KR" sz="2400" dirty="0"/>
               <a:t>.)</a:t>
             </a:r>
-            <a:endParaRPr lang="en-US" altLang="ko-KR" sz="2400" dirty="0"/>
           </a:p>
         </p:txBody>
       </p:sp>
@@ -4046,11 +3961,7 @@
             </a:r>
             <a:r>
               <a:rPr lang="ko-KR" altLang="en-US" dirty="0" smtClean="0"/>
-              <a:t> </a:t>
-            </a:r>
-            <a:r>
-              <a:rPr lang="ko-KR" altLang="en-US" dirty="0" smtClean="0"/>
-              <a:t>행동</a:t>
+              <a:t> 행동</a:t>
             </a:r>
             <a:r>
               <a:rPr lang="en-US" altLang="ko-KR" dirty="0"/>
@@ -4103,92 +4014,8 @@
             </a:r>
             <a:r>
               <a:rPr lang="en-US" altLang="ko-KR" sz="2400" dirty="0" smtClean="0"/>
-              <a:t>.</a:t>
-            </a:r>
-            <a:r>
-              <a:rPr lang="en-US" altLang="ko-KR" sz="2400" dirty="0" smtClean="0"/>
-              <a:t>)</a:t>
-            </a:r>
-            <a:endParaRPr lang="en-US" altLang="ko-KR" sz="2400" dirty="0" smtClean="0"/>
-          </a:p>
-          <a:p>
-            <a:r>
-              <a:rPr lang="ko-KR" altLang="en-US" sz="2400" dirty="0" smtClean="0">
-                <a:solidFill>
-                  <a:srgbClr val="FF0000"/>
-                </a:solidFill>
-              </a:rPr>
-              <a:t>구르기</a:t>
-            </a:r>
-            <a:r>
-              <a:rPr lang="en-US" altLang="ko-KR" sz="2400" dirty="0" smtClean="0"/>
-              <a:t>(</a:t>
-            </a:r>
-            <a:r>
-              <a:rPr lang="ko-KR" altLang="en-US" sz="2400" dirty="0" smtClean="0"/>
-              <a:t>빠르게 구른다</a:t>
-            </a:r>
-            <a:r>
-              <a:rPr lang="en-US" altLang="ko-KR" sz="2400" dirty="0" smtClean="0"/>
-              <a:t>, </a:t>
-            </a:r>
-            <a:r>
-              <a:rPr lang="ko-KR" altLang="en-US" sz="2400" dirty="0" smtClean="0"/>
-              <a:t>뛰기 상태에서 </a:t>
-            </a:r>
-            <a:r>
-              <a:rPr lang="en-US" altLang="ko-KR" sz="2400" dirty="0" smtClean="0"/>
-              <a:t>shift</a:t>
-            </a:r>
-            <a:r>
-              <a:rPr lang="ko-KR" altLang="en-US" sz="2400" dirty="0" smtClean="0"/>
-              <a:t>키를 누르면 구른다</a:t>
-            </a:r>
-            <a:r>
-              <a:rPr lang="en-US" altLang="ko-KR" sz="2400" dirty="0" smtClean="0"/>
-              <a:t>. </a:t>
-            </a:r>
-            <a:r>
-              <a:rPr lang="ko-KR" altLang="en-US" sz="2400" dirty="0" err="1" smtClean="0"/>
-              <a:t>충돌체가</a:t>
-            </a:r>
-            <a:r>
-              <a:rPr lang="ko-KR" altLang="en-US" sz="2400" dirty="0" smtClean="0"/>
-              <a:t> 줄어들고 이동속도가 빨라진다</a:t>
-            </a:r>
-            <a:r>
-              <a:rPr lang="en-US" altLang="ko-KR" sz="2400" dirty="0" smtClean="0"/>
-              <a:t>. </a:t>
-            </a:r>
-            <a:r>
-              <a:rPr lang="ko-KR" altLang="en-US" sz="2400" dirty="0" smtClean="0"/>
-              <a:t>하지만 구르기가 끝난 후 잠시 동안 경직된다</a:t>
-            </a:r>
-            <a:r>
-              <a:rPr lang="en-US" altLang="ko-KR" sz="2400" dirty="0" smtClean="0"/>
-              <a:t>. </a:t>
-            </a:r>
-            <a:r>
-              <a:rPr lang="ko-KR" altLang="en-US" sz="2400" dirty="0" smtClean="0"/>
-              <a:t>또한 적들 시야 </a:t>
-            </a:r>
-            <a:r>
-              <a:rPr lang="en-US" altLang="ko-KR" sz="2400" dirty="0" smtClean="0"/>
-              <a:t>ray</a:t>
-            </a:r>
-            <a:r>
-              <a:rPr lang="ko-KR" altLang="en-US" sz="2400" dirty="0" smtClean="0"/>
-              <a:t>에 맞지 않게 된다</a:t>
-            </a:r>
-            <a:r>
-              <a:rPr lang="en-US" altLang="ko-KR" sz="2400" dirty="0" smtClean="0"/>
-              <a:t>.</a:t>
-            </a:r>
-            <a:r>
-              <a:rPr lang="en-US" altLang="ko-KR" sz="2400" dirty="0" smtClean="0"/>
-              <a:t>)</a:t>
-            </a:r>
-            <a:endParaRPr lang="en-US" altLang="ko-KR" sz="2400" dirty="0" smtClean="0"/>
+              <a:t>.)</a:t>
+            </a:r>
           </a:p>
           <a:p>
             <a:r>
@@ -4284,11 +4111,7 @@
             </a:r>
             <a:r>
               <a:rPr lang="en-US" altLang="ko-KR" sz="2400" dirty="0" smtClean="0"/>
-              <a:t>.</a:t>
-            </a:r>
-            <a:r>
-              <a:rPr lang="en-US" altLang="ko-KR" sz="2400" dirty="0" smtClean="0"/>
-              <a:t>)</a:t>
+              <a:t>.)</a:t>
             </a:r>
             <a:endParaRPr lang="en-US" altLang="ko-KR" sz="2400" dirty="0"/>
           </a:p>

</xml_diff>